<commit_message>
fixing some build issues
</commit_message>
<xml_diff>
--- a/slides/lesson_03.pptx
+++ b/slides/lesson_03.pptx
@@ -5388,25 +5388,6 @@
           </a:p>
         </p:txBody>
       </p:sp>
-      <p:sp>
-        <p:nvSpPr>
-          <p:cNvPr id="5" name="Subtitle 4"/>
-          <p:cNvSpPr>
-            <a:spLocks noGrp="1"/>
-          </p:cNvSpPr>
-          <p:nvPr>
-            <p:ph type="subTitle" idx="1"/>
-          </p:nvPr>
-        </p:nvSpPr>
-        <p:spPr/>
-        <p:txBody>
-          <a:bodyPr/>
-          <a:lstStyle/>
-          <a:p>
-            <a:endParaRPr lang="en-US" dirty="0"/>
-          </a:p>
-        </p:txBody>
-      </p:sp>
     </p:spTree>
     <p:extLst>
       <p:ext uri="{BB962C8B-B14F-4D97-AF65-F5344CB8AC3E}">
@@ -7450,25 +7431,6 @@
           </a:p>
         </p:txBody>
       </p:sp>
-      <p:sp>
-        <p:nvSpPr>
-          <p:cNvPr id="5" name="Subtitle 4"/>
-          <p:cNvSpPr>
-            <a:spLocks noGrp="1"/>
-          </p:cNvSpPr>
-          <p:nvPr>
-            <p:ph type="subTitle" idx="1"/>
-          </p:nvPr>
-        </p:nvSpPr>
-        <p:spPr/>
-        <p:txBody>
-          <a:bodyPr/>
-          <a:lstStyle/>
-          <a:p>
-            <a:endParaRPr lang="en-US"/>
-          </a:p>
-        </p:txBody>
-      </p:sp>
     </p:spTree>
     <p:extLst>
       <p:ext uri="{BB962C8B-B14F-4D97-AF65-F5344CB8AC3E}">
@@ -10518,6 +10480,17 @@
               <a:rPr lang="en-US" sz="2800" dirty="0"/>
               <a:t>For small systems, monoliths are better</a:t>
             </a:r>
+          </a:p>
+          <a:p>
+            <a:r>
+              <a:rPr lang="en-US" sz="3200" dirty="0"/>
+              <a:t>Several research challenges on how to test </a:t>
+            </a:r>
+            <a:r>
+              <a:rPr lang="en-US" sz="3200"/>
+              <a:t>them automatically</a:t>
+            </a:r>
+            <a:endParaRPr lang="en-US" sz="3200" dirty="0"/>
           </a:p>
         </p:txBody>
       </p:sp>

</xml_diff>